<commit_message>
Added some more text to ppt
</commit_message>
<xml_diff>
--- a/research/AURA.pptx
+++ b/research/AURA.pptx
@@ -323,7 +323,7 @@
           <a:p>
             <a:fld id="{A6D53707-4441-4D3B-B1D4-D6CB21BA08CA}" type="slidenum">
               <a:rPr lang="nl-BE" smtClean="0"/>
-              <a:t>‹nr.›</a:t>
+              <a:t>‹#›</a:t>
             </a:fld>
             <a:endParaRPr lang="nl-BE"/>
           </a:p>
@@ -523,7 +523,7 @@
           <a:p>
             <a:fld id="{A6D53707-4441-4D3B-B1D4-D6CB21BA08CA}" type="slidenum">
               <a:rPr lang="nl-BE" smtClean="0"/>
-              <a:t>‹nr.›</a:t>
+              <a:t>‹#›</a:t>
             </a:fld>
             <a:endParaRPr lang="nl-BE"/>
           </a:p>
@@ -733,7 +733,7 @@
           <a:p>
             <a:fld id="{A6D53707-4441-4D3B-B1D4-D6CB21BA08CA}" type="slidenum">
               <a:rPr lang="nl-BE" smtClean="0"/>
-              <a:t>‹nr.›</a:t>
+              <a:t>‹#›</a:t>
             </a:fld>
             <a:endParaRPr lang="nl-BE"/>
           </a:p>
@@ -933,7 +933,7 @@
           <a:p>
             <a:fld id="{A6D53707-4441-4D3B-B1D4-D6CB21BA08CA}" type="slidenum">
               <a:rPr lang="nl-BE" smtClean="0"/>
-              <a:t>‹nr.›</a:t>
+              <a:t>‹#›</a:t>
             </a:fld>
             <a:endParaRPr lang="nl-BE"/>
           </a:p>
@@ -1209,7 +1209,7 @@
           <a:p>
             <a:fld id="{A6D53707-4441-4D3B-B1D4-D6CB21BA08CA}" type="slidenum">
               <a:rPr lang="nl-BE" smtClean="0"/>
-              <a:t>‹nr.›</a:t>
+              <a:t>‹#›</a:t>
             </a:fld>
             <a:endParaRPr lang="nl-BE"/>
           </a:p>
@@ -1477,7 +1477,7 @@
           <a:p>
             <a:fld id="{A6D53707-4441-4D3B-B1D4-D6CB21BA08CA}" type="slidenum">
               <a:rPr lang="nl-BE" smtClean="0"/>
-              <a:t>‹nr.›</a:t>
+              <a:t>‹#›</a:t>
             </a:fld>
             <a:endParaRPr lang="nl-BE"/>
           </a:p>
@@ -1892,7 +1892,7 @@
           <a:p>
             <a:fld id="{A6D53707-4441-4D3B-B1D4-D6CB21BA08CA}" type="slidenum">
               <a:rPr lang="nl-BE" smtClean="0"/>
-              <a:t>‹nr.›</a:t>
+              <a:t>‹#›</a:t>
             </a:fld>
             <a:endParaRPr lang="nl-BE"/>
           </a:p>
@@ -2034,7 +2034,7 @@
           <a:p>
             <a:fld id="{A6D53707-4441-4D3B-B1D4-D6CB21BA08CA}" type="slidenum">
               <a:rPr lang="nl-BE" smtClean="0"/>
-              <a:t>‹nr.›</a:t>
+              <a:t>‹#›</a:t>
             </a:fld>
             <a:endParaRPr lang="nl-BE"/>
           </a:p>
@@ -2147,7 +2147,7 @@
           <a:p>
             <a:fld id="{A6D53707-4441-4D3B-B1D4-D6CB21BA08CA}" type="slidenum">
               <a:rPr lang="nl-BE" smtClean="0"/>
-              <a:t>‹nr.›</a:t>
+              <a:t>‹#›</a:t>
             </a:fld>
             <a:endParaRPr lang="nl-BE"/>
           </a:p>
@@ -2460,7 +2460,7 @@
           <a:p>
             <a:fld id="{A6D53707-4441-4D3B-B1D4-D6CB21BA08CA}" type="slidenum">
               <a:rPr lang="nl-BE" smtClean="0"/>
-              <a:t>‹nr.›</a:t>
+              <a:t>‹#›</a:t>
             </a:fld>
             <a:endParaRPr lang="nl-BE"/>
           </a:p>
@@ -2749,7 +2749,7 @@
           <a:p>
             <a:fld id="{A6D53707-4441-4D3B-B1D4-D6CB21BA08CA}" type="slidenum">
               <a:rPr lang="nl-BE" smtClean="0"/>
-              <a:t>‹nr.›</a:t>
+              <a:t>‹#›</a:t>
             </a:fld>
             <a:endParaRPr lang="nl-BE"/>
           </a:p>
@@ -3028,7 +3028,7 @@
           <a:p>
             <a:fld id="{A6D53707-4441-4D3B-B1D4-D6CB21BA08CA}" type="slidenum">
               <a:rPr lang="nl-BE" smtClean="0"/>
-              <a:t>‹nr.›</a:t>
+              <a:t>‹#›</a:t>
             </a:fld>
             <a:endParaRPr lang="nl-BE"/>
           </a:p>
@@ -4087,6 +4087,29 @@
             </a:r>
           </a:p>
           <a:p>
+            <a:r>
+              <a:rPr lang="en-GB" dirty="0" err="1">
+                <a:latin typeface="Montserrat Medium" panose="00000600000000000000" pitchFamily="2" charset="0"/>
+              </a:rPr>
+              <a:t>Opvolging</a:t>
+            </a:r>
+            <a:r>
+              <a:rPr lang="en-GB" dirty="0">
+                <a:latin typeface="Montserrat Medium" panose="00000600000000000000" pitchFamily="2" charset="0"/>
+              </a:rPr>
+              <a:t> met feedback op </a:t>
+            </a:r>
+            <a:r>
+              <a:rPr lang="en-GB" dirty="0" err="1">
+                <a:latin typeface="Montserrat Medium" panose="00000600000000000000" pitchFamily="2" charset="0"/>
+              </a:rPr>
+              <a:t>straat</a:t>
+            </a:r>
+            <a:endParaRPr lang="en-GB" dirty="0">
+              <a:latin typeface="Montserrat Medium" panose="00000600000000000000" pitchFamily="2" charset="0"/>
+            </a:endParaRPr>
+          </a:p>
+          <a:p>
             <a:endParaRPr lang="en-GB" dirty="0">
               <a:latin typeface="Montserrat Medium" panose="00000600000000000000" pitchFamily="2" charset="0"/>
             </a:endParaRPr>
@@ -4484,7 +4507,7 @@
               <a:rPr lang="en-GB" dirty="0">
                 <a:latin typeface="Montserrat Medium" panose="00000600000000000000" pitchFamily="2" charset="0"/>
               </a:rPr>
-              <a:t>Meer extra features</a:t>
+              <a:t>Meer features</a:t>
             </a:r>
           </a:p>
           <a:p>
@@ -5465,7 +5488,42 @@
               <a:rPr lang="nl-BE" dirty="0">
                 <a:latin typeface="Montserrat Medium" panose="00000600000000000000" pitchFamily="2" charset="0"/>
               </a:rPr>
-              <a:t>Digitaliseren van wireframes</a:t>
+              <a:t>Digitaliseren van </a:t>
+            </a:r>
+            <a:r>
+              <a:rPr lang="nl-BE" dirty="0" err="1">
+                <a:latin typeface="Montserrat Medium" panose="00000600000000000000" pitchFamily="2" charset="0"/>
+              </a:rPr>
+              <a:t>wireframes</a:t>
+            </a:r>
+            <a:endParaRPr lang="nl-BE" dirty="0">
+              <a:latin typeface="Montserrat Medium" panose="00000600000000000000" pitchFamily="2" charset="0"/>
+            </a:endParaRPr>
+          </a:p>
+          <a:p>
+            <a:r>
+              <a:rPr lang="en-GB" dirty="0">
+                <a:latin typeface="Montserrat Medium" panose="00000600000000000000" pitchFamily="2" charset="0"/>
+              </a:rPr>
+              <a:t>L</a:t>
+            </a:r>
+            <a:r>
+              <a:rPr lang="nl-BE" dirty="0">
+                <a:latin typeface="Montserrat Medium" panose="00000600000000000000" pitchFamily="2" charset="0"/>
+              </a:rPr>
+              <a:t>ow </a:t>
+            </a:r>
+            <a:r>
+              <a:rPr lang="nl-BE" dirty="0" err="1">
+                <a:latin typeface="Montserrat Medium" panose="00000600000000000000" pitchFamily="2" charset="0"/>
+              </a:rPr>
+              <a:t>fidelity</a:t>
+            </a:r>
+            <a:r>
+              <a:rPr lang="nl-BE" dirty="0">
+                <a:latin typeface="Montserrat Medium" panose="00000600000000000000" pitchFamily="2" charset="0"/>
+              </a:rPr>
+              <a:t> prototypes (paper scans + Adobe XD)</a:t>
             </a:r>
           </a:p>
           <a:p>

</xml_diff>